<commit_message>
algorithm 4.2 code and video
</commit_message>
<xml_diff>
--- a/仿真记录/仿真进程记录.pptx
+++ b/仿真记录/仿真进程记录.pptx
@@ -7,7 +7,8 @@
   <p:sldIdLst>
     <p:sldId id="256" r:id="rId2"/>
     <p:sldId id="258" r:id="rId3"/>
-    <p:sldId id="257" r:id="rId4"/>
+    <p:sldId id="259" r:id="rId4"/>
+    <p:sldId id="257" r:id="rId5"/>
   </p:sldIdLst>
   <p:sldSz cx="12192000" cy="6858000"/>
   <p:notesSz cx="6858000" cy="9144000"/>
@@ -261,7 +262,7 @@
           <a:p>
             <a:fld id="{B47E15F2-B8BF-4BFB-A7C4-6FBB89BFFB6A}" type="datetimeFigureOut">
               <a:rPr lang="zh-CN" altLang="en-US" smtClean="0"/>
-              <a:t>2021/3/17</a:t>
+              <a:t>2021/3/24</a:t>
             </a:fld>
             <a:endParaRPr lang="zh-CN" altLang="en-US"/>
           </a:p>
@@ -459,7 +460,7 @@
           <a:p>
             <a:fld id="{B47E15F2-B8BF-4BFB-A7C4-6FBB89BFFB6A}" type="datetimeFigureOut">
               <a:rPr lang="zh-CN" altLang="en-US" smtClean="0"/>
-              <a:t>2021/3/17</a:t>
+              <a:t>2021/3/24</a:t>
             </a:fld>
             <a:endParaRPr lang="zh-CN" altLang="en-US"/>
           </a:p>
@@ -667,7 +668,7 @@
           <a:p>
             <a:fld id="{B47E15F2-B8BF-4BFB-A7C4-6FBB89BFFB6A}" type="datetimeFigureOut">
               <a:rPr lang="zh-CN" altLang="en-US" smtClean="0"/>
-              <a:t>2021/3/17</a:t>
+              <a:t>2021/3/24</a:t>
             </a:fld>
             <a:endParaRPr lang="zh-CN" altLang="en-US"/>
           </a:p>
@@ -865,7 +866,7 @@
           <a:p>
             <a:fld id="{B47E15F2-B8BF-4BFB-A7C4-6FBB89BFFB6A}" type="datetimeFigureOut">
               <a:rPr lang="zh-CN" altLang="en-US" smtClean="0"/>
-              <a:t>2021/3/17</a:t>
+              <a:t>2021/3/24</a:t>
             </a:fld>
             <a:endParaRPr lang="zh-CN" altLang="en-US"/>
           </a:p>
@@ -1140,7 +1141,7 @@
           <a:p>
             <a:fld id="{B47E15F2-B8BF-4BFB-A7C4-6FBB89BFFB6A}" type="datetimeFigureOut">
               <a:rPr lang="zh-CN" altLang="en-US" smtClean="0"/>
-              <a:t>2021/3/17</a:t>
+              <a:t>2021/3/24</a:t>
             </a:fld>
             <a:endParaRPr lang="zh-CN" altLang="en-US"/>
           </a:p>
@@ -1405,7 +1406,7 @@
           <a:p>
             <a:fld id="{B47E15F2-B8BF-4BFB-A7C4-6FBB89BFFB6A}" type="datetimeFigureOut">
               <a:rPr lang="zh-CN" altLang="en-US" smtClean="0"/>
-              <a:t>2021/3/17</a:t>
+              <a:t>2021/3/24</a:t>
             </a:fld>
             <a:endParaRPr lang="zh-CN" altLang="en-US"/>
           </a:p>
@@ -1817,7 +1818,7 @@
           <a:p>
             <a:fld id="{B47E15F2-B8BF-4BFB-A7C4-6FBB89BFFB6A}" type="datetimeFigureOut">
               <a:rPr lang="zh-CN" altLang="en-US" smtClean="0"/>
-              <a:t>2021/3/17</a:t>
+              <a:t>2021/3/24</a:t>
             </a:fld>
             <a:endParaRPr lang="zh-CN" altLang="en-US"/>
           </a:p>
@@ -1958,7 +1959,7 @@
           <a:p>
             <a:fld id="{B47E15F2-B8BF-4BFB-A7C4-6FBB89BFFB6A}" type="datetimeFigureOut">
               <a:rPr lang="zh-CN" altLang="en-US" smtClean="0"/>
-              <a:t>2021/3/17</a:t>
+              <a:t>2021/3/24</a:t>
             </a:fld>
             <a:endParaRPr lang="zh-CN" altLang="en-US"/>
           </a:p>
@@ -2071,7 +2072,7 @@
           <a:p>
             <a:fld id="{B47E15F2-B8BF-4BFB-A7C4-6FBB89BFFB6A}" type="datetimeFigureOut">
               <a:rPr lang="zh-CN" altLang="en-US" smtClean="0"/>
-              <a:t>2021/3/17</a:t>
+              <a:t>2021/3/24</a:t>
             </a:fld>
             <a:endParaRPr lang="zh-CN" altLang="en-US"/>
           </a:p>
@@ -2382,7 +2383,7 @@
           <a:p>
             <a:fld id="{B47E15F2-B8BF-4BFB-A7C4-6FBB89BFFB6A}" type="datetimeFigureOut">
               <a:rPr lang="zh-CN" altLang="en-US" smtClean="0"/>
-              <a:t>2021/3/17</a:t>
+              <a:t>2021/3/24</a:t>
             </a:fld>
             <a:endParaRPr lang="zh-CN" altLang="en-US"/>
           </a:p>
@@ -2670,7 +2671,7 @@
           <a:p>
             <a:fld id="{B47E15F2-B8BF-4BFB-A7C4-6FBB89BFFB6A}" type="datetimeFigureOut">
               <a:rPr lang="zh-CN" altLang="en-US" smtClean="0"/>
-              <a:t>2021/3/17</a:t>
+              <a:t>2021/3/24</a:t>
             </a:fld>
             <a:endParaRPr lang="zh-CN" altLang="en-US"/>
           </a:p>
@@ -2911,7 +2912,7 @@
           <a:p>
             <a:fld id="{B47E15F2-B8BF-4BFB-A7C4-6FBB89BFFB6A}" type="datetimeFigureOut">
               <a:rPr lang="zh-CN" altLang="en-US" smtClean="0"/>
-              <a:t>2021/3/17</a:t>
+              <a:t>2021/3/24</a:t>
             </a:fld>
             <a:endParaRPr lang="zh-CN" altLang="en-US"/>
           </a:p>
@@ -6487,6 +6488,1939 @@
       </p:grpSpPr>
       <p:sp>
         <p:nvSpPr>
+          <p:cNvPr id="5" name="文本框 4">
+            <a:extLst>
+              <a:ext uri="{FF2B5EF4-FFF2-40B4-BE49-F238E27FC236}">
+                <a16:creationId xmlns:a16="http://schemas.microsoft.com/office/drawing/2014/main" id="{BCEFC701-4DD7-4222-97B4-D3F9007E43A7}"/>
+              </a:ext>
+            </a:extLst>
+          </p:cNvPr>
+          <p:cNvSpPr txBox="1"/>
+          <p:nvPr/>
+        </p:nvSpPr>
+        <p:spPr>
+          <a:xfrm>
+            <a:off x="2295236" y="408373"/>
+            <a:ext cx="466794" cy="769441"/>
+          </a:xfrm>
+          <a:prstGeom prst="rect">
+            <a:avLst/>
+          </a:prstGeom>
+          <a:noFill/>
+        </p:spPr>
+        <p:txBody>
+          <a:bodyPr wrap="square" rtlCol="0">
+            <a:spAutoFit/>
+          </a:bodyPr>
+          <a:lstStyle/>
+          <a:p>
+            <a:r>
+              <a:rPr lang="en-US" altLang="zh-CN" sz="4400" b="1" dirty="0">
+                <a:latin typeface="Times New Roman" panose="02020603050405020304" pitchFamily="18" charset="0"/>
+                <a:cs typeface="Times New Roman" panose="02020603050405020304" pitchFamily="18" charset="0"/>
+              </a:rPr>
+              <a:t>1</a:t>
+            </a:r>
+            <a:endParaRPr lang="zh-CN" altLang="en-US" sz="4400" b="1" dirty="0">
+              <a:latin typeface="Times New Roman" panose="02020603050405020304" pitchFamily="18" charset="0"/>
+              <a:cs typeface="Times New Roman" panose="02020603050405020304" pitchFamily="18" charset="0"/>
+            </a:endParaRPr>
+          </a:p>
+        </p:txBody>
+      </p:sp>
+      <p:sp>
+        <p:nvSpPr>
+          <p:cNvPr id="7" name="文本框 6">
+            <a:extLst>
+              <a:ext uri="{FF2B5EF4-FFF2-40B4-BE49-F238E27FC236}">
+                <a16:creationId xmlns:a16="http://schemas.microsoft.com/office/drawing/2014/main" id="{40D0512B-0B1F-4319-BDEE-A7B7ECCF651F}"/>
+              </a:ext>
+            </a:extLst>
+          </p:cNvPr>
+          <p:cNvSpPr txBox="1"/>
+          <p:nvPr/>
+        </p:nvSpPr>
+        <p:spPr>
+          <a:xfrm>
+            <a:off x="1197677" y="1575841"/>
+            <a:ext cx="466794" cy="769441"/>
+          </a:xfrm>
+          <a:prstGeom prst="rect">
+            <a:avLst/>
+          </a:prstGeom>
+          <a:noFill/>
+        </p:spPr>
+        <p:txBody>
+          <a:bodyPr wrap="square" rtlCol="0">
+            <a:spAutoFit/>
+          </a:bodyPr>
+          <a:lstStyle/>
+          <a:p>
+            <a:r>
+              <a:rPr lang="en-US" altLang="zh-CN" sz="4400" b="1" dirty="0">
+                <a:latin typeface="Times New Roman" panose="02020603050405020304" pitchFamily="18" charset="0"/>
+                <a:cs typeface="Times New Roman" panose="02020603050405020304" pitchFamily="18" charset="0"/>
+              </a:rPr>
+              <a:t>2</a:t>
+            </a:r>
+            <a:endParaRPr lang="zh-CN" altLang="en-US" sz="4400" b="1" dirty="0">
+              <a:latin typeface="Times New Roman" panose="02020603050405020304" pitchFamily="18" charset="0"/>
+              <a:cs typeface="Times New Roman" panose="02020603050405020304" pitchFamily="18" charset="0"/>
+            </a:endParaRPr>
+          </a:p>
+        </p:txBody>
+      </p:sp>
+      <p:sp>
+        <p:nvSpPr>
+          <p:cNvPr id="8" name="文本框 7">
+            <a:extLst>
+              <a:ext uri="{FF2B5EF4-FFF2-40B4-BE49-F238E27FC236}">
+                <a16:creationId xmlns:a16="http://schemas.microsoft.com/office/drawing/2014/main" id="{CA30BA55-54A5-418B-BFB8-10AFC3AA93AF}"/>
+              </a:ext>
+            </a:extLst>
+          </p:cNvPr>
+          <p:cNvSpPr txBox="1"/>
+          <p:nvPr/>
+        </p:nvSpPr>
+        <p:spPr>
+          <a:xfrm>
+            <a:off x="3278147" y="1575841"/>
+            <a:ext cx="466794" cy="769441"/>
+          </a:xfrm>
+          <a:prstGeom prst="rect">
+            <a:avLst/>
+          </a:prstGeom>
+          <a:noFill/>
+        </p:spPr>
+        <p:txBody>
+          <a:bodyPr wrap="square" rtlCol="0">
+            <a:spAutoFit/>
+          </a:bodyPr>
+          <a:lstStyle/>
+          <a:p>
+            <a:r>
+              <a:rPr lang="en-US" altLang="zh-CN" sz="4400" b="1" dirty="0">
+                <a:latin typeface="Times New Roman" panose="02020603050405020304" pitchFamily="18" charset="0"/>
+                <a:cs typeface="Times New Roman" panose="02020603050405020304" pitchFamily="18" charset="0"/>
+              </a:rPr>
+              <a:t>3</a:t>
+            </a:r>
+            <a:endParaRPr lang="zh-CN" altLang="en-US" sz="4400" b="1" dirty="0">
+              <a:latin typeface="Times New Roman" panose="02020603050405020304" pitchFamily="18" charset="0"/>
+              <a:cs typeface="Times New Roman" panose="02020603050405020304" pitchFamily="18" charset="0"/>
+            </a:endParaRPr>
+          </a:p>
+        </p:txBody>
+      </p:sp>
+      <p:sp>
+        <p:nvSpPr>
+          <p:cNvPr id="9" name="文本框 8">
+            <a:extLst>
+              <a:ext uri="{FF2B5EF4-FFF2-40B4-BE49-F238E27FC236}">
+                <a16:creationId xmlns:a16="http://schemas.microsoft.com/office/drawing/2014/main" id="{255D6604-B660-41E6-9796-3B6255C34816}"/>
+              </a:ext>
+            </a:extLst>
+          </p:cNvPr>
+          <p:cNvSpPr txBox="1"/>
+          <p:nvPr/>
+        </p:nvSpPr>
+        <p:spPr>
+          <a:xfrm>
+            <a:off x="488834" y="2677962"/>
+            <a:ext cx="466794" cy="769441"/>
+          </a:xfrm>
+          <a:prstGeom prst="rect">
+            <a:avLst/>
+          </a:prstGeom>
+          <a:noFill/>
+        </p:spPr>
+        <p:txBody>
+          <a:bodyPr wrap="square" rtlCol="0">
+            <a:spAutoFit/>
+          </a:bodyPr>
+          <a:lstStyle/>
+          <a:p>
+            <a:r>
+              <a:rPr lang="en-US" altLang="zh-CN" sz="4400" b="1" dirty="0">
+                <a:latin typeface="Times New Roman" panose="02020603050405020304" pitchFamily="18" charset="0"/>
+                <a:cs typeface="Times New Roman" panose="02020603050405020304" pitchFamily="18" charset="0"/>
+              </a:rPr>
+              <a:t>4</a:t>
+            </a:r>
+            <a:endParaRPr lang="zh-CN" altLang="en-US" sz="4400" b="1" dirty="0">
+              <a:latin typeface="Times New Roman" panose="02020603050405020304" pitchFamily="18" charset="0"/>
+              <a:cs typeface="Times New Roman" panose="02020603050405020304" pitchFamily="18" charset="0"/>
+            </a:endParaRPr>
+          </a:p>
+        </p:txBody>
+      </p:sp>
+      <p:cxnSp>
+        <p:nvCxnSpPr>
+          <p:cNvPr id="11" name="直接箭头连接符 10">
+            <a:extLst>
+              <a:ext uri="{FF2B5EF4-FFF2-40B4-BE49-F238E27FC236}">
+                <a16:creationId xmlns:a16="http://schemas.microsoft.com/office/drawing/2014/main" id="{35B446F8-FD63-48BD-BBD4-FD2DC42DFAE8}"/>
+              </a:ext>
+            </a:extLst>
+          </p:cNvPr>
+          <p:cNvCxnSpPr>
+            <a:cxnSpLocks/>
+          </p:cNvCxnSpPr>
+          <p:nvPr/>
+        </p:nvCxnSpPr>
+        <p:spPr>
+          <a:xfrm flipH="1">
+            <a:off x="1616527" y="1141813"/>
+            <a:ext cx="847288" cy="637563"/>
+          </a:xfrm>
+          <a:prstGeom prst="straightConnector1">
+            <a:avLst/>
+          </a:prstGeom>
+          <a:ln>
+            <a:tailEnd type="triangle"/>
+          </a:ln>
+        </p:spPr>
+        <p:style>
+          <a:lnRef idx="1">
+            <a:schemeClr val="accent1"/>
+          </a:lnRef>
+          <a:fillRef idx="0">
+            <a:schemeClr val="accent1"/>
+          </a:fillRef>
+          <a:effectRef idx="0">
+            <a:schemeClr val="accent1"/>
+          </a:effectRef>
+          <a:fontRef idx="minor">
+            <a:schemeClr val="tx1"/>
+          </a:fontRef>
+        </p:style>
+      </p:cxnSp>
+      <p:cxnSp>
+        <p:nvCxnSpPr>
+          <p:cNvPr id="13" name="直接箭头连接符 12">
+            <a:extLst>
+              <a:ext uri="{FF2B5EF4-FFF2-40B4-BE49-F238E27FC236}">
+                <a16:creationId xmlns:a16="http://schemas.microsoft.com/office/drawing/2014/main" id="{16256648-B64C-40A4-84DB-C9D0ACAFCDF5}"/>
+              </a:ext>
+            </a:extLst>
+          </p:cNvPr>
+          <p:cNvCxnSpPr>
+            <a:cxnSpLocks/>
+          </p:cNvCxnSpPr>
+          <p:nvPr/>
+        </p:nvCxnSpPr>
+        <p:spPr>
+          <a:xfrm>
+            <a:off x="2599546" y="1185386"/>
+            <a:ext cx="682601" cy="586417"/>
+          </a:xfrm>
+          <a:prstGeom prst="straightConnector1">
+            <a:avLst/>
+          </a:prstGeom>
+          <a:ln>
+            <a:tailEnd type="triangle"/>
+          </a:ln>
+        </p:spPr>
+        <p:style>
+          <a:lnRef idx="1">
+            <a:schemeClr val="accent1"/>
+          </a:lnRef>
+          <a:fillRef idx="0">
+            <a:schemeClr val="accent1"/>
+          </a:fillRef>
+          <a:effectRef idx="0">
+            <a:schemeClr val="accent1"/>
+          </a:effectRef>
+          <a:fontRef idx="minor">
+            <a:schemeClr val="tx1"/>
+          </a:fontRef>
+        </p:style>
+      </p:cxnSp>
+      <p:cxnSp>
+        <p:nvCxnSpPr>
+          <p:cNvPr id="18" name="直接箭头连接符 17">
+            <a:extLst>
+              <a:ext uri="{FF2B5EF4-FFF2-40B4-BE49-F238E27FC236}">
+                <a16:creationId xmlns:a16="http://schemas.microsoft.com/office/drawing/2014/main" id="{60384780-E800-4D88-BD6F-3E8196F5C043}"/>
+              </a:ext>
+            </a:extLst>
+          </p:cNvPr>
+          <p:cNvCxnSpPr>
+            <a:cxnSpLocks/>
+          </p:cNvCxnSpPr>
+          <p:nvPr/>
+        </p:nvCxnSpPr>
+        <p:spPr>
+          <a:xfrm flipV="1">
+            <a:off x="1755639" y="1953793"/>
+            <a:ext cx="1477056" cy="1"/>
+          </a:xfrm>
+          <a:prstGeom prst="straightConnector1">
+            <a:avLst/>
+          </a:prstGeom>
+          <a:ln>
+            <a:headEnd type="none"/>
+            <a:tailEnd type="triangle"/>
+          </a:ln>
+        </p:spPr>
+        <p:style>
+          <a:lnRef idx="1">
+            <a:schemeClr val="accent1"/>
+          </a:lnRef>
+          <a:fillRef idx="0">
+            <a:schemeClr val="accent1"/>
+          </a:fillRef>
+          <a:effectRef idx="0">
+            <a:schemeClr val="accent1"/>
+          </a:effectRef>
+          <a:fontRef idx="minor">
+            <a:schemeClr val="tx1"/>
+          </a:fontRef>
+        </p:style>
+      </p:cxnSp>
+      <p:cxnSp>
+        <p:nvCxnSpPr>
+          <p:cNvPr id="19" name="直接箭头连接符 18">
+            <a:extLst>
+              <a:ext uri="{FF2B5EF4-FFF2-40B4-BE49-F238E27FC236}">
+                <a16:creationId xmlns:a16="http://schemas.microsoft.com/office/drawing/2014/main" id="{57A2EF17-8212-4B43-9A32-798EB99B7CD9}"/>
+              </a:ext>
+            </a:extLst>
+          </p:cNvPr>
+          <p:cNvCxnSpPr>
+            <a:cxnSpLocks/>
+          </p:cNvCxnSpPr>
+          <p:nvPr/>
+        </p:nvCxnSpPr>
+        <p:spPr>
+          <a:xfrm flipH="1">
+            <a:off x="847370" y="2235419"/>
+            <a:ext cx="442763" cy="522466"/>
+          </a:xfrm>
+          <a:prstGeom prst="straightConnector1">
+            <a:avLst/>
+          </a:prstGeom>
+          <a:ln>
+            <a:headEnd type="triangle"/>
+            <a:tailEnd type="triangle"/>
+          </a:ln>
+        </p:spPr>
+        <p:style>
+          <a:lnRef idx="1">
+            <a:schemeClr val="accent1"/>
+          </a:lnRef>
+          <a:fillRef idx="0">
+            <a:schemeClr val="accent1"/>
+          </a:fillRef>
+          <a:effectRef idx="0">
+            <a:schemeClr val="accent1"/>
+          </a:effectRef>
+          <a:fontRef idx="minor">
+            <a:schemeClr val="tx1"/>
+          </a:fontRef>
+        </p:style>
+      </p:cxnSp>
+      <p:sp>
+        <p:nvSpPr>
+          <p:cNvPr id="2" name="文本框 1">
+            <a:extLst>
+              <a:ext uri="{FF2B5EF4-FFF2-40B4-BE49-F238E27FC236}">
+                <a16:creationId xmlns:a16="http://schemas.microsoft.com/office/drawing/2014/main" id="{BAB7CFDF-7D2E-465B-B08C-3516268BDC90}"/>
+              </a:ext>
+            </a:extLst>
+          </p:cNvPr>
+          <p:cNvSpPr txBox="1"/>
+          <p:nvPr/>
+        </p:nvSpPr>
+        <p:spPr>
+          <a:xfrm>
+            <a:off x="4421095" y="423762"/>
+            <a:ext cx="4479721" cy="369332"/>
+          </a:xfrm>
+          <a:prstGeom prst="rect">
+            <a:avLst/>
+          </a:prstGeom>
+          <a:noFill/>
+        </p:spPr>
+        <p:txBody>
+          <a:bodyPr wrap="square" rtlCol="0">
+            <a:spAutoFit/>
+          </a:bodyPr>
+          <a:lstStyle/>
+          <a:p>
+            <a:r>
+              <a:rPr lang="zh-CN" altLang="en-US" dirty="0"/>
+              <a:t>二阶积分器</a:t>
+            </a:r>
+            <a:r>
+              <a:rPr lang="en-US" altLang="zh-CN" dirty="0"/>
+              <a:t>-</a:t>
+            </a:r>
+            <a:r>
+              <a:rPr lang="zh-CN" altLang="en-US" dirty="0"/>
+              <a:t>算法（</a:t>
+            </a:r>
+            <a:r>
+              <a:rPr lang="en-US" altLang="zh-CN" dirty="0"/>
+              <a:t>4.2</a:t>
+            </a:r>
+            <a:r>
+              <a:rPr lang="zh-CN" altLang="en-US" dirty="0"/>
+              <a:t>）</a:t>
+            </a:r>
+          </a:p>
+        </p:txBody>
+      </p:sp>
+      <p:graphicFrame>
+        <p:nvGraphicFramePr>
+          <p:cNvPr id="3" name="对象 2">
+            <a:extLst>
+              <a:ext uri="{FF2B5EF4-FFF2-40B4-BE49-F238E27FC236}">
+                <a16:creationId xmlns:a16="http://schemas.microsoft.com/office/drawing/2014/main" id="{8F0CC4E6-B54F-4C0A-B742-F1C97A4D506B}"/>
+              </a:ext>
+            </a:extLst>
+          </p:cNvPr>
+          <p:cNvGraphicFramePr>
+            <a:graphicFrameLocks noChangeAspect="1"/>
+          </p:cNvGraphicFramePr>
+          <p:nvPr/>
+        </p:nvGraphicFramePr>
+        <p:xfrm>
+          <a:off x="8982364" y="3308011"/>
+          <a:ext cx="914400" cy="198438"/>
+        </p:xfrm>
+        <a:graphic>
+          <a:graphicData uri="http://schemas.openxmlformats.org/presentationml/2006/ole">
+            <mc:AlternateContent xmlns:mc="http://schemas.openxmlformats.org/markup-compatibility/2006">
+              <mc:Choice xmlns:v="urn:schemas-microsoft-com:vml" Requires="v">
+                <p:oleObj name="Equation" r:id="rId2" imgW="914400" imgH="198720" progId="Equation.DSMT4">
+                  <p:embed/>
+                </p:oleObj>
+              </mc:Choice>
+              <mc:Fallback>
+                <p:oleObj name="Equation" r:id="rId2" imgW="914400" imgH="198720" progId="Equation.DSMT4">
+                  <p:embed/>
+                  <p:pic>
+                    <p:nvPicPr>
+                      <p:cNvPr id="3" name="对象 2">
+                        <a:extLst>
+                          <a:ext uri="{FF2B5EF4-FFF2-40B4-BE49-F238E27FC236}">
+                            <a16:creationId xmlns:a16="http://schemas.microsoft.com/office/drawing/2014/main" id="{8F0CC4E6-B54F-4C0A-B742-F1C97A4D506B}"/>
+                          </a:ext>
+                        </a:extLst>
+                      </p:cNvPr>
+                      <p:cNvPicPr/>
+                      <p:nvPr/>
+                    </p:nvPicPr>
+                    <p:blipFill>
+                      <a:blip r:embed="rId3"/>
+                      <a:stretch>
+                        <a:fillRect/>
+                      </a:stretch>
+                    </p:blipFill>
+                    <p:spPr>
+                      <a:xfrm>
+                        <a:off x="8982364" y="3308011"/>
+                        <a:ext cx="914400" cy="198438"/>
+                      </a:xfrm>
+                      <a:prstGeom prst="rect">
+                        <a:avLst/>
+                      </a:prstGeom>
+                    </p:spPr>
+                  </p:pic>
+                </p:oleObj>
+              </mc:Fallback>
+            </mc:AlternateContent>
+          </a:graphicData>
+        </a:graphic>
+      </p:graphicFrame>
+      <p:cxnSp>
+        <p:nvCxnSpPr>
+          <p:cNvPr id="6" name="直接箭头连接符 5">
+            <a:extLst>
+              <a:ext uri="{FF2B5EF4-FFF2-40B4-BE49-F238E27FC236}">
+                <a16:creationId xmlns:a16="http://schemas.microsoft.com/office/drawing/2014/main" id="{2B2B203E-06DA-4822-A3BC-530CC06534DD}"/>
+              </a:ext>
+            </a:extLst>
+          </p:cNvPr>
+          <p:cNvCxnSpPr>
+            <a:cxnSpLocks/>
+          </p:cNvCxnSpPr>
+          <p:nvPr/>
+        </p:nvCxnSpPr>
+        <p:spPr>
+          <a:xfrm>
+            <a:off x="7694283" y="3597313"/>
+            <a:ext cx="2202481" cy="0"/>
+          </a:xfrm>
+          <a:prstGeom prst="straightConnector1">
+            <a:avLst/>
+          </a:prstGeom>
+          <a:ln>
+            <a:tailEnd type="triangle"/>
+          </a:ln>
+        </p:spPr>
+        <p:style>
+          <a:lnRef idx="1">
+            <a:schemeClr val="accent1"/>
+          </a:lnRef>
+          <a:fillRef idx="0">
+            <a:schemeClr val="accent1"/>
+          </a:fillRef>
+          <a:effectRef idx="0">
+            <a:schemeClr val="accent1"/>
+          </a:effectRef>
+          <a:fontRef idx="minor">
+            <a:schemeClr val="tx1"/>
+          </a:fontRef>
+        </p:style>
+      </p:cxnSp>
+      <p:cxnSp>
+        <p:nvCxnSpPr>
+          <p:cNvPr id="12" name="直接箭头连接符 11">
+            <a:extLst>
+              <a:ext uri="{FF2B5EF4-FFF2-40B4-BE49-F238E27FC236}">
+                <a16:creationId xmlns:a16="http://schemas.microsoft.com/office/drawing/2014/main" id="{594AD3AB-77C7-49C6-AE64-A639CA645A57}"/>
+              </a:ext>
+            </a:extLst>
+          </p:cNvPr>
+          <p:cNvCxnSpPr>
+            <a:cxnSpLocks/>
+          </p:cNvCxnSpPr>
+          <p:nvPr/>
+        </p:nvCxnSpPr>
+        <p:spPr>
+          <a:xfrm flipV="1">
+            <a:off x="7694283" y="1758611"/>
+            <a:ext cx="0" cy="1838703"/>
+          </a:xfrm>
+          <a:prstGeom prst="straightConnector1">
+            <a:avLst/>
+          </a:prstGeom>
+          <a:ln>
+            <a:tailEnd type="triangle"/>
+          </a:ln>
+        </p:spPr>
+        <p:style>
+          <a:lnRef idx="1">
+            <a:schemeClr val="accent1"/>
+          </a:lnRef>
+          <a:fillRef idx="0">
+            <a:schemeClr val="accent1"/>
+          </a:fillRef>
+          <a:effectRef idx="0">
+            <a:schemeClr val="accent1"/>
+          </a:effectRef>
+          <a:fontRef idx="minor">
+            <a:schemeClr val="tx1"/>
+          </a:fontRef>
+        </p:style>
+      </p:cxnSp>
+      <p:cxnSp>
+        <p:nvCxnSpPr>
+          <p:cNvPr id="16" name="直接连接符 15">
+            <a:extLst>
+              <a:ext uri="{FF2B5EF4-FFF2-40B4-BE49-F238E27FC236}">
+                <a16:creationId xmlns:a16="http://schemas.microsoft.com/office/drawing/2014/main" id="{E160F79E-595D-47A6-A597-7E6C8F2FDFD7}"/>
+              </a:ext>
+            </a:extLst>
+          </p:cNvPr>
+          <p:cNvCxnSpPr/>
+          <p:nvPr/>
+        </p:nvCxnSpPr>
+        <p:spPr>
+          <a:xfrm>
+            <a:off x="7980033" y="2633885"/>
+            <a:ext cx="1115878" cy="0"/>
+          </a:xfrm>
+          <a:prstGeom prst="line">
+            <a:avLst/>
+          </a:prstGeom>
+        </p:spPr>
+        <p:style>
+          <a:lnRef idx="1">
+            <a:schemeClr val="accent1"/>
+          </a:lnRef>
+          <a:fillRef idx="0">
+            <a:schemeClr val="accent1"/>
+          </a:fillRef>
+          <a:effectRef idx="0">
+            <a:schemeClr val="accent1"/>
+          </a:effectRef>
+          <a:fontRef idx="minor">
+            <a:schemeClr val="tx1"/>
+          </a:fontRef>
+        </p:style>
+      </p:cxnSp>
+      <p:sp>
+        <p:nvSpPr>
+          <p:cNvPr id="23" name="星形: 五角 22">
+            <a:extLst>
+              <a:ext uri="{FF2B5EF4-FFF2-40B4-BE49-F238E27FC236}">
+                <a16:creationId xmlns:a16="http://schemas.microsoft.com/office/drawing/2014/main" id="{59B335D9-2BA8-43C0-9201-67BD5482C9E7}"/>
+              </a:ext>
+            </a:extLst>
+          </p:cNvPr>
+          <p:cNvSpPr/>
+          <p:nvPr/>
+        </p:nvSpPr>
+        <p:spPr>
+          <a:xfrm>
+            <a:off x="7928264" y="2545872"/>
+            <a:ext cx="126991" cy="133343"/>
+          </a:xfrm>
+          <a:prstGeom prst="star5">
+            <a:avLst/>
+          </a:prstGeom>
+        </p:spPr>
+        <p:style>
+          <a:lnRef idx="2">
+            <a:schemeClr val="accent1">
+              <a:shade val="50000"/>
+            </a:schemeClr>
+          </a:lnRef>
+          <a:fillRef idx="1">
+            <a:schemeClr val="accent1"/>
+          </a:fillRef>
+          <a:effectRef idx="0">
+            <a:schemeClr val="accent1"/>
+          </a:effectRef>
+          <a:fontRef idx="minor">
+            <a:schemeClr val="lt1"/>
+          </a:fontRef>
+        </p:style>
+        <p:txBody>
+          <a:bodyPr rtlCol="0" anchor="ctr"/>
+          <a:lstStyle/>
+          <a:p>
+            <a:pPr algn="ctr"/>
+            <a:endParaRPr lang="zh-CN" altLang="en-US"/>
+          </a:p>
+        </p:txBody>
+      </p:sp>
+      <p:sp>
+        <p:nvSpPr>
+          <p:cNvPr id="25" name="星形: 五角 24">
+            <a:extLst>
+              <a:ext uri="{FF2B5EF4-FFF2-40B4-BE49-F238E27FC236}">
+                <a16:creationId xmlns:a16="http://schemas.microsoft.com/office/drawing/2014/main" id="{FBD22D11-BC9C-45E7-8538-C58C8EA878D8}"/>
+              </a:ext>
+            </a:extLst>
+          </p:cNvPr>
+          <p:cNvSpPr/>
+          <p:nvPr/>
+        </p:nvSpPr>
+        <p:spPr>
+          <a:xfrm>
+            <a:off x="9032416" y="2545872"/>
+            <a:ext cx="126991" cy="133343"/>
+          </a:xfrm>
+          <a:prstGeom prst="star5">
+            <a:avLst/>
+          </a:prstGeom>
+        </p:spPr>
+        <p:style>
+          <a:lnRef idx="2">
+            <a:schemeClr val="accent1">
+              <a:shade val="50000"/>
+            </a:schemeClr>
+          </a:lnRef>
+          <a:fillRef idx="1">
+            <a:schemeClr val="accent1"/>
+          </a:fillRef>
+          <a:effectRef idx="0">
+            <a:schemeClr val="accent1"/>
+          </a:effectRef>
+          <a:fontRef idx="minor">
+            <a:schemeClr val="lt1"/>
+          </a:fontRef>
+        </p:style>
+        <p:txBody>
+          <a:bodyPr rtlCol="0" anchor="ctr"/>
+          <a:lstStyle/>
+          <a:p>
+            <a:pPr algn="ctr"/>
+            <a:endParaRPr lang="zh-CN" altLang="en-US"/>
+          </a:p>
+        </p:txBody>
+      </p:sp>
+      <p:sp>
+        <p:nvSpPr>
+          <p:cNvPr id="26" name="星形: 五角 25">
+            <a:extLst>
+              <a:ext uri="{FF2B5EF4-FFF2-40B4-BE49-F238E27FC236}">
+                <a16:creationId xmlns:a16="http://schemas.microsoft.com/office/drawing/2014/main" id="{3AA83AD6-C73C-495E-AB16-1287C3F2E32C}"/>
+              </a:ext>
+            </a:extLst>
+          </p:cNvPr>
+          <p:cNvSpPr/>
+          <p:nvPr/>
+        </p:nvSpPr>
+        <p:spPr>
+          <a:xfrm>
+            <a:off x="7099105" y="3184624"/>
+            <a:ext cx="126991" cy="133343"/>
+          </a:xfrm>
+          <a:prstGeom prst="star5">
+            <a:avLst/>
+          </a:prstGeom>
+        </p:spPr>
+        <p:style>
+          <a:lnRef idx="2">
+            <a:schemeClr val="accent1">
+              <a:shade val="50000"/>
+            </a:schemeClr>
+          </a:lnRef>
+          <a:fillRef idx="1">
+            <a:schemeClr val="accent1"/>
+          </a:fillRef>
+          <a:effectRef idx="0">
+            <a:schemeClr val="accent1"/>
+          </a:effectRef>
+          <a:fontRef idx="minor">
+            <a:schemeClr val="lt1"/>
+          </a:fontRef>
+        </p:style>
+        <p:txBody>
+          <a:bodyPr rtlCol="0" anchor="ctr"/>
+          <a:lstStyle/>
+          <a:p>
+            <a:pPr algn="ctr"/>
+            <a:endParaRPr lang="zh-CN" altLang="en-US"/>
+          </a:p>
+        </p:txBody>
+      </p:sp>
+      <p:sp>
+        <p:nvSpPr>
+          <p:cNvPr id="27" name="星形: 五角 26">
+            <a:extLst>
+              <a:ext uri="{FF2B5EF4-FFF2-40B4-BE49-F238E27FC236}">
+                <a16:creationId xmlns:a16="http://schemas.microsoft.com/office/drawing/2014/main" id="{FB43BBA0-C031-41EF-B377-A9A9E15642E0}"/>
+              </a:ext>
+            </a:extLst>
+          </p:cNvPr>
+          <p:cNvSpPr/>
+          <p:nvPr/>
+        </p:nvSpPr>
+        <p:spPr>
+          <a:xfrm>
+            <a:off x="8239421" y="3169092"/>
+            <a:ext cx="126991" cy="133343"/>
+          </a:xfrm>
+          <a:prstGeom prst="star5">
+            <a:avLst/>
+          </a:prstGeom>
+        </p:spPr>
+        <p:style>
+          <a:lnRef idx="2">
+            <a:schemeClr val="accent1">
+              <a:shade val="50000"/>
+            </a:schemeClr>
+          </a:lnRef>
+          <a:fillRef idx="1">
+            <a:schemeClr val="accent1"/>
+          </a:fillRef>
+          <a:effectRef idx="0">
+            <a:schemeClr val="accent1"/>
+          </a:effectRef>
+          <a:fontRef idx="minor">
+            <a:schemeClr val="lt1"/>
+          </a:fontRef>
+        </p:style>
+        <p:txBody>
+          <a:bodyPr rtlCol="0" anchor="ctr"/>
+          <a:lstStyle/>
+          <a:p>
+            <a:pPr algn="ctr"/>
+            <a:endParaRPr lang="zh-CN" altLang="en-US"/>
+          </a:p>
+        </p:txBody>
+      </p:sp>
+      <p:graphicFrame>
+        <p:nvGraphicFramePr>
+          <p:cNvPr id="28" name="对象 27">
+            <a:extLst>
+              <a:ext uri="{FF2B5EF4-FFF2-40B4-BE49-F238E27FC236}">
+                <a16:creationId xmlns:a16="http://schemas.microsoft.com/office/drawing/2014/main" id="{ED5B4717-488A-4E39-BA06-087B84A0F559}"/>
+              </a:ext>
+            </a:extLst>
+          </p:cNvPr>
+          <p:cNvGraphicFramePr>
+            <a:graphicFrameLocks noChangeAspect="1"/>
+          </p:cNvGraphicFramePr>
+          <p:nvPr>
+            <p:extLst>
+              <p:ext uri="{D42A27DB-BD31-4B8C-83A1-F6EECF244321}">
+                <p14:modId xmlns:p14="http://schemas.microsoft.com/office/powerpoint/2010/main" val="3006359012"/>
+              </p:ext>
+            </p:extLst>
+          </p:nvPr>
+        </p:nvGraphicFramePr>
+        <p:xfrm>
+          <a:off x="311150" y="4883150"/>
+          <a:ext cx="5456238" cy="1347788"/>
+        </p:xfrm>
+        <a:graphic>
+          <a:graphicData uri="http://schemas.openxmlformats.org/presentationml/2006/ole">
+            <mc:AlternateContent xmlns:mc="http://schemas.openxmlformats.org/markup-compatibility/2006">
+              <mc:Choice xmlns:v="urn:schemas-microsoft-com:vml" Requires="v">
+                <p:oleObj name="Equation" r:id="rId4" imgW="7403760" imgH="1828800" progId="Equation.DSMT4">
+                  <p:embed/>
+                </p:oleObj>
+              </mc:Choice>
+              <mc:Fallback>
+                <p:oleObj name="Equation" r:id="rId4" imgW="7403760" imgH="1828800" progId="Equation.DSMT4">
+                  <p:embed/>
+                  <p:pic>
+                    <p:nvPicPr>
+                      <p:cNvPr id="28" name="对象 27">
+                        <a:extLst>
+                          <a:ext uri="{FF2B5EF4-FFF2-40B4-BE49-F238E27FC236}">
+                            <a16:creationId xmlns:a16="http://schemas.microsoft.com/office/drawing/2014/main" id="{ED5B4717-488A-4E39-BA06-087B84A0F559}"/>
+                          </a:ext>
+                        </a:extLst>
+                      </p:cNvPr>
+                      <p:cNvPicPr/>
+                      <p:nvPr/>
+                    </p:nvPicPr>
+                    <p:blipFill>
+                      <a:blip r:embed="rId5"/>
+                      <a:stretch>
+                        <a:fillRect/>
+                      </a:stretch>
+                    </p:blipFill>
+                    <p:spPr>
+                      <a:xfrm>
+                        <a:off x="311150" y="4883150"/>
+                        <a:ext cx="5456238" cy="1347788"/>
+                      </a:xfrm>
+                      <a:prstGeom prst="rect">
+                        <a:avLst/>
+                      </a:prstGeom>
+                    </p:spPr>
+                  </p:pic>
+                </p:oleObj>
+              </mc:Fallback>
+            </mc:AlternateContent>
+          </a:graphicData>
+        </a:graphic>
+      </p:graphicFrame>
+      <p:cxnSp>
+        <p:nvCxnSpPr>
+          <p:cNvPr id="33" name="直接箭头连接符 32">
+            <a:extLst>
+              <a:ext uri="{FF2B5EF4-FFF2-40B4-BE49-F238E27FC236}">
+                <a16:creationId xmlns:a16="http://schemas.microsoft.com/office/drawing/2014/main" id="{B08E7488-070C-46FB-8F22-9FF38BF6CC5A}"/>
+              </a:ext>
+            </a:extLst>
+          </p:cNvPr>
+          <p:cNvCxnSpPr>
+            <a:cxnSpLocks/>
+          </p:cNvCxnSpPr>
+          <p:nvPr/>
+        </p:nvCxnSpPr>
+        <p:spPr>
+          <a:xfrm flipH="1">
+            <a:off x="6899073" y="3597313"/>
+            <a:ext cx="792034" cy="875275"/>
+          </a:xfrm>
+          <a:prstGeom prst="straightConnector1">
+            <a:avLst/>
+          </a:prstGeom>
+          <a:ln>
+            <a:tailEnd type="triangle"/>
+          </a:ln>
+        </p:spPr>
+        <p:style>
+          <a:lnRef idx="1">
+            <a:schemeClr val="accent1"/>
+          </a:lnRef>
+          <a:fillRef idx="0">
+            <a:schemeClr val="accent1"/>
+          </a:fillRef>
+          <a:effectRef idx="0">
+            <a:schemeClr val="accent1"/>
+          </a:effectRef>
+          <a:fontRef idx="minor">
+            <a:schemeClr val="tx1"/>
+          </a:fontRef>
+        </p:style>
+      </p:cxnSp>
+      <p:cxnSp>
+        <p:nvCxnSpPr>
+          <p:cNvPr id="36" name="直接连接符 35">
+            <a:extLst>
+              <a:ext uri="{FF2B5EF4-FFF2-40B4-BE49-F238E27FC236}">
+                <a16:creationId xmlns:a16="http://schemas.microsoft.com/office/drawing/2014/main" id="{84CAD1E0-2F78-4565-8642-260440E4EFA0}"/>
+              </a:ext>
+            </a:extLst>
+          </p:cNvPr>
+          <p:cNvCxnSpPr>
+            <a:endCxn id="26" idx="4"/>
+          </p:cNvCxnSpPr>
+          <p:nvPr/>
+        </p:nvCxnSpPr>
+        <p:spPr>
+          <a:xfrm flipH="1">
+            <a:off x="7226096" y="2633885"/>
+            <a:ext cx="750760" cy="601671"/>
+          </a:xfrm>
+          <a:prstGeom prst="line">
+            <a:avLst/>
+          </a:prstGeom>
+        </p:spPr>
+        <p:style>
+          <a:lnRef idx="1">
+            <a:schemeClr val="accent1"/>
+          </a:lnRef>
+          <a:fillRef idx="0">
+            <a:schemeClr val="accent1"/>
+          </a:fillRef>
+          <a:effectRef idx="0">
+            <a:schemeClr val="accent1"/>
+          </a:effectRef>
+          <a:fontRef idx="minor">
+            <a:schemeClr val="tx1"/>
+          </a:fontRef>
+        </p:style>
+      </p:cxnSp>
+      <p:cxnSp>
+        <p:nvCxnSpPr>
+          <p:cNvPr id="37" name="直接连接符 36">
+            <a:extLst>
+              <a:ext uri="{FF2B5EF4-FFF2-40B4-BE49-F238E27FC236}">
+                <a16:creationId xmlns:a16="http://schemas.microsoft.com/office/drawing/2014/main" id="{B411B3DF-5CE2-4878-AA49-54C5CC9E82A1}"/>
+              </a:ext>
+            </a:extLst>
+          </p:cNvPr>
+          <p:cNvCxnSpPr/>
+          <p:nvPr/>
+        </p:nvCxnSpPr>
+        <p:spPr>
+          <a:xfrm flipH="1">
+            <a:off x="8345151" y="2623802"/>
+            <a:ext cx="750760" cy="601671"/>
+          </a:xfrm>
+          <a:prstGeom prst="line">
+            <a:avLst/>
+          </a:prstGeom>
+        </p:spPr>
+        <p:style>
+          <a:lnRef idx="1">
+            <a:schemeClr val="accent1"/>
+          </a:lnRef>
+          <a:fillRef idx="0">
+            <a:schemeClr val="accent1"/>
+          </a:fillRef>
+          <a:effectRef idx="0">
+            <a:schemeClr val="accent1"/>
+          </a:effectRef>
+          <a:fontRef idx="minor">
+            <a:schemeClr val="tx1"/>
+          </a:fontRef>
+        </p:style>
+      </p:cxnSp>
+      <p:cxnSp>
+        <p:nvCxnSpPr>
+          <p:cNvPr id="39" name="直接连接符 38">
+            <a:extLst>
+              <a:ext uri="{FF2B5EF4-FFF2-40B4-BE49-F238E27FC236}">
+                <a16:creationId xmlns:a16="http://schemas.microsoft.com/office/drawing/2014/main" id="{54524EEA-86A8-4EC8-9A28-5102B50E2ACF}"/>
+              </a:ext>
+            </a:extLst>
+          </p:cNvPr>
+          <p:cNvCxnSpPr/>
+          <p:nvPr/>
+        </p:nvCxnSpPr>
+        <p:spPr>
+          <a:xfrm>
+            <a:off x="7139748" y="3251295"/>
+            <a:ext cx="1115878" cy="0"/>
+          </a:xfrm>
+          <a:prstGeom prst="line">
+            <a:avLst/>
+          </a:prstGeom>
+        </p:spPr>
+        <p:style>
+          <a:lnRef idx="1">
+            <a:schemeClr val="accent1"/>
+          </a:lnRef>
+          <a:fillRef idx="0">
+            <a:schemeClr val="accent1"/>
+          </a:fillRef>
+          <a:effectRef idx="0">
+            <a:schemeClr val="accent1"/>
+          </a:effectRef>
+          <a:fontRef idx="minor">
+            <a:schemeClr val="tx1"/>
+          </a:fontRef>
+        </p:style>
+      </p:cxnSp>
+      <p:graphicFrame>
+        <p:nvGraphicFramePr>
+          <p:cNvPr id="44" name="对象 43">
+            <a:extLst>
+              <a:ext uri="{FF2B5EF4-FFF2-40B4-BE49-F238E27FC236}">
+                <a16:creationId xmlns:a16="http://schemas.microsoft.com/office/drawing/2014/main" id="{3744C54E-2309-4998-9FA3-E97C21D80B72}"/>
+              </a:ext>
+            </a:extLst>
+          </p:cNvPr>
+          <p:cNvGraphicFramePr>
+            <a:graphicFrameLocks noChangeAspect="1"/>
+          </p:cNvGraphicFramePr>
+          <p:nvPr/>
+        </p:nvGraphicFramePr>
+        <p:xfrm>
+          <a:off x="7613650" y="4367213"/>
+          <a:ext cx="1282700" cy="1828800"/>
+        </p:xfrm>
+        <a:graphic>
+          <a:graphicData uri="http://schemas.openxmlformats.org/presentationml/2006/ole">
+            <mc:AlternateContent xmlns:mc="http://schemas.openxmlformats.org/markup-compatibility/2006">
+              <mc:Choice xmlns:v="urn:schemas-microsoft-com:vml" Requires="v">
+                <p:oleObj name="Equation" r:id="rId6" imgW="1282680" imgH="1828800" progId="Equation.DSMT4">
+                  <p:embed/>
+                </p:oleObj>
+              </mc:Choice>
+              <mc:Fallback>
+                <p:oleObj name="Equation" r:id="rId6" imgW="1282680" imgH="1828800" progId="Equation.DSMT4">
+                  <p:embed/>
+                  <p:pic>
+                    <p:nvPicPr>
+                      <p:cNvPr id="44" name="对象 43">
+                        <a:extLst>
+                          <a:ext uri="{FF2B5EF4-FFF2-40B4-BE49-F238E27FC236}">
+                            <a16:creationId xmlns:a16="http://schemas.microsoft.com/office/drawing/2014/main" id="{3744C54E-2309-4998-9FA3-E97C21D80B72}"/>
+                          </a:ext>
+                        </a:extLst>
+                      </p:cNvPr>
+                      <p:cNvPicPr/>
+                      <p:nvPr/>
+                    </p:nvPicPr>
+                    <p:blipFill>
+                      <a:blip r:embed="rId7"/>
+                      <a:stretch>
+                        <a:fillRect/>
+                      </a:stretch>
+                    </p:blipFill>
+                    <p:spPr>
+                      <a:xfrm>
+                        <a:off x="7613650" y="4367213"/>
+                        <a:ext cx="1282700" cy="1828800"/>
+                      </a:xfrm>
+                      <a:prstGeom prst="rect">
+                        <a:avLst/>
+                      </a:prstGeom>
+                    </p:spPr>
+                  </p:pic>
+                </p:oleObj>
+              </mc:Fallback>
+            </mc:AlternateContent>
+          </a:graphicData>
+        </a:graphic>
+      </p:graphicFrame>
+      <p:sp>
+        <p:nvSpPr>
+          <p:cNvPr id="46" name="文本框 45">
+            <a:extLst>
+              <a:ext uri="{FF2B5EF4-FFF2-40B4-BE49-F238E27FC236}">
+                <a16:creationId xmlns:a16="http://schemas.microsoft.com/office/drawing/2014/main" id="{B3D97B9F-C413-49C7-BC6E-C3D90AB1FAAB}"/>
+              </a:ext>
+            </a:extLst>
+          </p:cNvPr>
+          <p:cNvSpPr txBox="1"/>
+          <p:nvPr/>
+        </p:nvSpPr>
+        <p:spPr>
+          <a:xfrm>
+            <a:off x="6632311" y="4287923"/>
+            <a:ext cx="466794" cy="369332"/>
+          </a:xfrm>
+          <a:prstGeom prst="rect">
+            <a:avLst/>
+          </a:prstGeom>
+          <a:noFill/>
+        </p:spPr>
+        <p:txBody>
+          <a:bodyPr wrap="square" rtlCol="0">
+            <a:spAutoFit/>
+          </a:bodyPr>
+          <a:lstStyle/>
+          <a:p>
+            <a:r>
+              <a:rPr lang="en-US" altLang="zh-CN" dirty="0">
+                <a:latin typeface="Times New Roman" panose="02020603050405020304" pitchFamily="18" charset="0"/>
+                <a:cs typeface="Times New Roman" panose="02020603050405020304" pitchFamily="18" charset="0"/>
+              </a:rPr>
+              <a:t>x</a:t>
+            </a:r>
+            <a:endParaRPr lang="zh-CN" altLang="en-US" dirty="0">
+              <a:latin typeface="Times New Roman" panose="02020603050405020304" pitchFamily="18" charset="0"/>
+              <a:cs typeface="Times New Roman" panose="02020603050405020304" pitchFamily="18" charset="0"/>
+            </a:endParaRPr>
+          </a:p>
+        </p:txBody>
+      </p:sp>
+      <p:sp>
+        <p:nvSpPr>
+          <p:cNvPr id="47" name="文本框 46">
+            <a:extLst>
+              <a:ext uri="{FF2B5EF4-FFF2-40B4-BE49-F238E27FC236}">
+                <a16:creationId xmlns:a16="http://schemas.microsoft.com/office/drawing/2014/main" id="{4AE4852B-2CF4-4967-A790-256A4542A6E4}"/>
+              </a:ext>
+            </a:extLst>
+          </p:cNvPr>
+          <p:cNvSpPr txBox="1"/>
+          <p:nvPr/>
+        </p:nvSpPr>
+        <p:spPr>
+          <a:xfrm>
+            <a:off x="9853990" y="3461344"/>
+            <a:ext cx="466794" cy="369332"/>
+          </a:xfrm>
+          <a:prstGeom prst="rect">
+            <a:avLst/>
+          </a:prstGeom>
+          <a:noFill/>
+        </p:spPr>
+        <p:txBody>
+          <a:bodyPr wrap="square" rtlCol="0">
+            <a:spAutoFit/>
+          </a:bodyPr>
+          <a:lstStyle/>
+          <a:p>
+            <a:r>
+              <a:rPr lang="en-US" altLang="zh-CN" dirty="0">
+                <a:latin typeface="Times New Roman" panose="02020603050405020304" pitchFamily="18" charset="0"/>
+                <a:cs typeface="Times New Roman" panose="02020603050405020304" pitchFamily="18" charset="0"/>
+              </a:rPr>
+              <a:t>y</a:t>
+            </a:r>
+            <a:endParaRPr lang="zh-CN" altLang="en-US" dirty="0">
+              <a:latin typeface="Times New Roman" panose="02020603050405020304" pitchFamily="18" charset="0"/>
+              <a:cs typeface="Times New Roman" panose="02020603050405020304" pitchFamily="18" charset="0"/>
+            </a:endParaRPr>
+          </a:p>
+        </p:txBody>
+      </p:sp>
+      <p:sp>
+        <p:nvSpPr>
+          <p:cNvPr id="48" name="文本框 47">
+            <a:extLst>
+              <a:ext uri="{FF2B5EF4-FFF2-40B4-BE49-F238E27FC236}">
+                <a16:creationId xmlns:a16="http://schemas.microsoft.com/office/drawing/2014/main" id="{230034B2-265E-4592-9C02-CDF657989605}"/>
+              </a:ext>
+            </a:extLst>
+          </p:cNvPr>
+          <p:cNvSpPr txBox="1"/>
+          <p:nvPr/>
+        </p:nvSpPr>
+        <p:spPr>
+          <a:xfrm>
+            <a:off x="7697460" y="1520842"/>
+            <a:ext cx="466794" cy="369332"/>
+          </a:xfrm>
+          <a:prstGeom prst="rect">
+            <a:avLst/>
+          </a:prstGeom>
+          <a:noFill/>
+        </p:spPr>
+        <p:txBody>
+          <a:bodyPr wrap="square" rtlCol="0">
+            <a:spAutoFit/>
+          </a:bodyPr>
+          <a:lstStyle/>
+          <a:p>
+            <a:r>
+              <a:rPr lang="en-US" altLang="zh-CN" dirty="0">
+                <a:latin typeface="Times New Roman" panose="02020603050405020304" pitchFamily="18" charset="0"/>
+                <a:cs typeface="Times New Roman" panose="02020603050405020304" pitchFamily="18" charset="0"/>
+              </a:rPr>
+              <a:t>z</a:t>
+            </a:r>
+            <a:endParaRPr lang="zh-CN" altLang="en-US" dirty="0">
+              <a:latin typeface="Times New Roman" panose="02020603050405020304" pitchFamily="18" charset="0"/>
+              <a:cs typeface="Times New Roman" panose="02020603050405020304" pitchFamily="18" charset="0"/>
+            </a:endParaRPr>
+          </a:p>
+        </p:txBody>
+      </p:sp>
+      <p:sp>
+        <p:nvSpPr>
+          <p:cNvPr id="38" name="文本框 37">
+            <a:extLst>
+              <a:ext uri="{FF2B5EF4-FFF2-40B4-BE49-F238E27FC236}">
+                <a16:creationId xmlns:a16="http://schemas.microsoft.com/office/drawing/2014/main" id="{B4BEAC4E-82BC-4136-B8FE-40302C927998}"/>
+              </a:ext>
+            </a:extLst>
+          </p:cNvPr>
+          <p:cNvSpPr txBox="1"/>
+          <p:nvPr/>
+        </p:nvSpPr>
+        <p:spPr>
+          <a:xfrm>
+            <a:off x="2267294" y="2640503"/>
+            <a:ext cx="466794" cy="769441"/>
+          </a:xfrm>
+          <a:prstGeom prst="rect">
+            <a:avLst/>
+          </a:prstGeom>
+          <a:noFill/>
+        </p:spPr>
+        <p:txBody>
+          <a:bodyPr wrap="square" rtlCol="0">
+            <a:spAutoFit/>
+          </a:bodyPr>
+          <a:lstStyle/>
+          <a:p>
+            <a:r>
+              <a:rPr lang="en-US" altLang="zh-CN" sz="4400" b="1" dirty="0">
+                <a:latin typeface="Times New Roman" panose="02020603050405020304" pitchFamily="18" charset="0"/>
+                <a:cs typeface="Times New Roman" panose="02020603050405020304" pitchFamily="18" charset="0"/>
+              </a:rPr>
+              <a:t>5</a:t>
+            </a:r>
+            <a:endParaRPr lang="zh-CN" altLang="en-US" sz="4400" b="1" dirty="0">
+              <a:latin typeface="Times New Roman" panose="02020603050405020304" pitchFamily="18" charset="0"/>
+              <a:cs typeface="Times New Roman" panose="02020603050405020304" pitchFamily="18" charset="0"/>
+            </a:endParaRPr>
+          </a:p>
+        </p:txBody>
+      </p:sp>
+      <p:sp>
+        <p:nvSpPr>
+          <p:cNvPr id="40" name="文本框 39">
+            <a:extLst>
+              <a:ext uri="{FF2B5EF4-FFF2-40B4-BE49-F238E27FC236}">
+                <a16:creationId xmlns:a16="http://schemas.microsoft.com/office/drawing/2014/main" id="{E7A0C46B-8520-4710-82D6-5BDECED20906}"/>
+              </a:ext>
+            </a:extLst>
+          </p:cNvPr>
+          <p:cNvSpPr txBox="1"/>
+          <p:nvPr/>
+        </p:nvSpPr>
+        <p:spPr>
+          <a:xfrm>
+            <a:off x="3022600" y="3737318"/>
+            <a:ext cx="466794" cy="769441"/>
+          </a:xfrm>
+          <a:prstGeom prst="rect">
+            <a:avLst/>
+          </a:prstGeom>
+          <a:noFill/>
+        </p:spPr>
+        <p:txBody>
+          <a:bodyPr wrap="square" rtlCol="0">
+            <a:spAutoFit/>
+          </a:bodyPr>
+          <a:lstStyle/>
+          <a:p>
+            <a:r>
+              <a:rPr lang="en-US" altLang="zh-CN" sz="4400" b="1" dirty="0">
+                <a:latin typeface="Times New Roman" panose="02020603050405020304" pitchFamily="18" charset="0"/>
+                <a:cs typeface="Times New Roman" panose="02020603050405020304" pitchFamily="18" charset="0"/>
+              </a:rPr>
+              <a:t>8</a:t>
+            </a:r>
+            <a:endParaRPr lang="zh-CN" altLang="en-US" sz="4400" b="1" dirty="0">
+              <a:latin typeface="Times New Roman" panose="02020603050405020304" pitchFamily="18" charset="0"/>
+              <a:cs typeface="Times New Roman" panose="02020603050405020304" pitchFamily="18" charset="0"/>
+            </a:endParaRPr>
+          </a:p>
+        </p:txBody>
+      </p:sp>
+      <p:sp>
+        <p:nvSpPr>
+          <p:cNvPr id="41" name="文本框 40">
+            <a:extLst>
+              <a:ext uri="{FF2B5EF4-FFF2-40B4-BE49-F238E27FC236}">
+                <a16:creationId xmlns:a16="http://schemas.microsoft.com/office/drawing/2014/main" id="{69924EC2-AF69-42BA-9847-4C9831C0D008}"/>
+              </a:ext>
+            </a:extLst>
+          </p:cNvPr>
+          <p:cNvSpPr txBox="1"/>
+          <p:nvPr/>
+        </p:nvSpPr>
+        <p:spPr>
+          <a:xfrm>
+            <a:off x="7444001" y="1112419"/>
+            <a:ext cx="1070175" cy="400110"/>
+          </a:xfrm>
+          <a:prstGeom prst="rect">
+            <a:avLst/>
+          </a:prstGeom>
+          <a:noFill/>
+        </p:spPr>
+        <p:txBody>
+          <a:bodyPr wrap="square" rtlCol="0">
+            <a:spAutoFit/>
+          </a:bodyPr>
+          <a:lstStyle/>
+          <a:p>
+            <a:r>
+              <a:rPr lang="zh-CN" altLang="en-US" sz="2000" dirty="0">
+                <a:latin typeface="宋体" panose="02010600030101010101" pitchFamily="2" charset="-122"/>
+                <a:ea typeface="宋体" panose="02010600030101010101" pitchFamily="2" charset="-122"/>
+                <a:cs typeface="Times New Roman" panose="02020603050405020304" pitchFamily="18" charset="0"/>
+              </a:rPr>
+              <a:t>菱形</a:t>
+            </a:r>
+          </a:p>
+        </p:txBody>
+      </p:sp>
+      <p:sp>
+        <p:nvSpPr>
+          <p:cNvPr id="49" name="文本框 48">
+            <a:extLst>
+              <a:ext uri="{FF2B5EF4-FFF2-40B4-BE49-F238E27FC236}">
+                <a16:creationId xmlns:a16="http://schemas.microsoft.com/office/drawing/2014/main" id="{316908F3-C3F2-4249-A301-1C00834D61BF}"/>
+              </a:ext>
+            </a:extLst>
+          </p:cNvPr>
+          <p:cNvSpPr txBox="1"/>
+          <p:nvPr/>
+        </p:nvSpPr>
+        <p:spPr>
+          <a:xfrm>
+            <a:off x="4146360" y="2659232"/>
+            <a:ext cx="466794" cy="769441"/>
+          </a:xfrm>
+          <a:prstGeom prst="rect">
+            <a:avLst/>
+          </a:prstGeom>
+          <a:noFill/>
+        </p:spPr>
+        <p:txBody>
+          <a:bodyPr wrap="square" rtlCol="0">
+            <a:spAutoFit/>
+          </a:bodyPr>
+          <a:lstStyle/>
+          <a:p>
+            <a:r>
+              <a:rPr lang="en-US" altLang="zh-CN" sz="4400" b="1" dirty="0">
+                <a:latin typeface="Times New Roman" panose="02020603050405020304" pitchFamily="18" charset="0"/>
+                <a:cs typeface="Times New Roman" panose="02020603050405020304" pitchFamily="18" charset="0"/>
+              </a:rPr>
+              <a:t>6</a:t>
+            </a:r>
+            <a:endParaRPr lang="zh-CN" altLang="en-US" sz="4400" b="1" dirty="0">
+              <a:latin typeface="Times New Roman" panose="02020603050405020304" pitchFamily="18" charset="0"/>
+              <a:cs typeface="Times New Roman" panose="02020603050405020304" pitchFamily="18" charset="0"/>
+            </a:endParaRPr>
+          </a:p>
+        </p:txBody>
+      </p:sp>
+      <p:sp>
+        <p:nvSpPr>
+          <p:cNvPr id="51" name="文本框 50">
+            <a:extLst>
+              <a:ext uri="{FF2B5EF4-FFF2-40B4-BE49-F238E27FC236}">
+                <a16:creationId xmlns:a16="http://schemas.microsoft.com/office/drawing/2014/main" id="{1AF3683E-34AD-4AD6-BA68-41E30EB1E7D2}"/>
+              </a:ext>
+            </a:extLst>
+          </p:cNvPr>
+          <p:cNvSpPr txBox="1"/>
+          <p:nvPr/>
+        </p:nvSpPr>
+        <p:spPr>
+          <a:xfrm>
+            <a:off x="1664471" y="3779429"/>
+            <a:ext cx="466794" cy="769441"/>
+          </a:xfrm>
+          <a:prstGeom prst="rect">
+            <a:avLst/>
+          </a:prstGeom>
+          <a:noFill/>
+        </p:spPr>
+        <p:txBody>
+          <a:bodyPr wrap="square" rtlCol="0">
+            <a:spAutoFit/>
+          </a:bodyPr>
+          <a:lstStyle/>
+          <a:p>
+            <a:r>
+              <a:rPr lang="en-US" altLang="zh-CN" sz="4400" b="1" dirty="0">
+                <a:latin typeface="Times New Roman" panose="02020603050405020304" pitchFamily="18" charset="0"/>
+                <a:cs typeface="Times New Roman" panose="02020603050405020304" pitchFamily="18" charset="0"/>
+              </a:rPr>
+              <a:t>7</a:t>
+            </a:r>
+            <a:endParaRPr lang="zh-CN" altLang="en-US" sz="4400" b="1" dirty="0">
+              <a:latin typeface="Times New Roman" panose="02020603050405020304" pitchFamily="18" charset="0"/>
+              <a:cs typeface="Times New Roman" panose="02020603050405020304" pitchFamily="18" charset="0"/>
+            </a:endParaRPr>
+          </a:p>
+        </p:txBody>
+      </p:sp>
+      <p:cxnSp>
+        <p:nvCxnSpPr>
+          <p:cNvPr id="52" name="直接箭头连接符 51">
+            <a:extLst>
+              <a:ext uri="{FF2B5EF4-FFF2-40B4-BE49-F238E27FC236}">
+                <a16:creationId xmlns:a16="http://schemas.microsoft.com/office/drawing/2014/main" id="{2D2944E2-7063-4D67-823E-C00E968D8924}"/>
+              </a:ext>
+            </a:extLst>
+          </p:cNvPr>
+          <p:cNvCxnSpPr>
+            <a:cxnSpLocks/>
+            <a:endCxn id="38" idx="1"/>
+          </p:cNvCxnSpPr>
+          <p:nvPr/>
+        </p:nvCxnSpPr>
+        <p:spPr>
+          <a:xfrm flipV="1">
+            <a:off x="834530" y="3025224"/>
+            <a:ext cx="1432764" cy="37458"/>
+          </a:xfrm>
+          <a:prstGeom prst="straightConnector1">
+            <a:avLst/>
+          </a:prstGeom>
+          <a:ln>
+            <a:headEnd type="none"/>
+            <a:tailEnd type="triangle"/>
+          </a:ln>
+        </p:spPr>
+        <p:style>
+          <a:lnRef idx="1">
+            <a:schemeClr val="accent1"/>
+          </a:lnRef>
+          <a:fillRef idx="0">
+            <a:schemeClr val="accent1"/>
+          </a:fillRef>
+          <a:effectRef idx="0">
+            <a:schemeClr val="accent1"/>
+          </a:effectRef>
+          <a:fontRef idx="minor">
+            <a:schemeClr val="tx1"/>
+          </a:fontRef>
+        </p:style>
+      </p:cxnSp>
+      <p:cxnSp>
+        <p:nvCxnSpPr>
+          <p:cNvPr id="54" name="直接箭头连接符 53">
+            <a:extLst>
+              <a:ext uri="{FF2B5EF4-FFF2-40B4-BE49-F238E27FC236}">
+                <a16:creationId xmlns:a16="http://schemas.microsoft.com/office/drawing/2014/main" id="{4759A452-9438-4677-8817-FE5EA4372C9A}"/>
+              </a:ext>
+            </a:extLst>
+          </p:cNvPr>
+          <p:cNvCxnSpPr>
+            <a:cxnSpLocks/>
+            <a:stCxn id="9" idx="2"/>
+            <a:endCxn id="51" idx="1"/>
+          </p:cNvCxnSpPr>
+          <p:nvPr/>
+        </p:nvCxnSpPr>
+        <p:spPr>
+          <a:xfrm>
+            <a:off x="722231" y="3447403"/>
+            <a:ext cx="942240" cy="716747"/>
+          </a:xfrm>
+          <a:prstGeom prst="straightConnector1">
+            <a:avLst/>
+          </a:prstGeom>
+          <a:ln>
+            <a:headEnd type="triangle"/>
+            <a:tailEnd type="triangle"/>
+          </a:ln>
+        </p:spPr>
+        <p:style>
+          <a:lnRef idx="1">
+            <a:schemeClr val="accent1"/>
+          </a:lnRef>
+          <a:fillRef idx="0">
+            <a:schemeClr val="accent1"/>
+          </a:fillRef>
+          <a:effectRef idx="0">
+            <a:schemeClr val="accent1"/>
+          </a:effectRef>
+          <a:fontRef idx="minor">
+            <a:schemeClr val="tx1"/>
+          </a:fontRef>
+        </p:style>
+      </p:cxnSp>
+      <p:cxnSp>
+        <p:nvCxnSpPr>
+          <p:cNvPr id="55" name="直接箭头连接符 54">
+            <a:extLst>
+              <a:ext uri="{FF2B5EF4-FFF2-40B4-BE49-F238E27FC236}">
+                <a16:creationId xmlns:a16="http://schemas.microsoft.com/office/drawing/2014/main" id="{184B6B6A-6B3D-4F87-BAA7-56DAB863A8F9}"/>
+              </a:ext>
+            </a:extLst>
+          </p:cNvPr>
+          <p:cNvCxnSpPr>
+            <a:cxnSpLocks/>
+            <a:stCxn id="38" idx="2"/>
+          </p:cNvCxnSpPr>
+          <p:nvPr/>
+        </p:nvCxnSpPr>
+        <p:spPr>
+          <a:xfrm>
+            <a:off x="2500691" y="3409944"/>
+            <a:ext cx="572814" cy="565561"/>
+          </a:xfrm>
+          <a:prstGeom prst="straightConnector1">
+            <a:avLst/>
+          </a:prstGeom>
+          <a:ln>
+            <a:headEnd type="triangle"/>
+            <a:tailEnd type="triangle"/>
+          </a:ln>
+        </p:spPr>
+        <p:style>
+          <a:lnRef idx="1">
+            <a:schemeClr val="accent1"/>
+          </a:lnRef>
+          <a:fillRef idx="0">
+            <a:schemeClr val="accent1"/>
+          </a:fillRef>
+          <a:effectRef idx="0">
+            <a:schemeClr val="accent1"/>
+          </a:effectRef>
+          <a:fontRef idx="minor">
+            <a:schemeClr val="tx1"/>
+          </a:fontRef>
+        </p:style>
+      </p:cxnSp>
+      <p:cxnSp>
+        <p:nvCxnSpPr>
+          <p:cNvPr id="57" name="直接箭头连接符 56">
+            <a:extLst>
+              <a:ext uri="{FF2B5EF4-FFF2-40B4-BE49-F238E27FC236}">
+                <a16:creationId xmlns:a16="http://schemas.microsoft.com/office/drawing/2014/main" id="{DBBC51E1-082D-4A64-8095-FCF78BEBD3DC}"/>
+              </a:ext>
+            </a:extLst>
+          </p:cNvPr>
+          <p:cNvCxnSpPr>
+            <a:cxnSpLocks/>
+          </p:cNvCxnSpPr>
+          <p:nvPr/>
+        </p:nvCxnSpPr>
+        <p:spPr>
+          <a:xfrm>
+            <a:off x="3631792" y="2190793"/>
+            <a:ext cx="701584" cy="651435"/>
+          </a:xfrm>
+          <a:prstGeom prst="straightConnector1">
+            <a:avLst/>
+          </a:prstGeom>
+          <a:ln>
+            <a:headEnd type="triangle"/>
+            <a:tailEnd type="triangle"/>
+          </a:ln>
+        </p:spPr>
+        <p:style>
+          <a:lnRef idx="1">
+            <a:schemeClr val="accent1"/>
+          </a:lnRef>
+          <a:fillRef idx="0">
+            <a:schemeClr val="accent1"/>
+          </a:fillRef>
+          <a:effectRef idx="0">
+            <a:schemeClr val="accent1"/>
+          </a:effectRef>
+          <a:fontRef idx="minor">
+            <a:schemeClr val="tx1"/>
+          </a:fontRef>
+        </p:style>
+      </p:cxnSp>
+      <p:cxnSp>
+        <p:nvCxnSpPr>
+          <p:cNvPr id="61" name="直接箭头连接符 60">
+            <a:extLst>
+              <a:ext uri="{FF2B5EF4-FFF2-40B4-BE49-F238E27FC236}">
+                <a16:creationId xmlns:a16="http://schemas.microsoft.com/office/drawing/2014/main" id="{CA3F7D25-45CC-4BC2-8625-FE2A67CCF481}"/>
+              </a:ext>
+            </a:extLst>
+          </p:cNvPr>
+          <p:cNvCxnSpPr>
+            <a:cxnSpLocks/>
+            <a:stCxn id="38" idx="3"/>
+            <a:endCxn id="49" idx="1"/>
+          </p:cNvCxnSpPr>
+          <p:nvPr/>
+        </p:nvCxnSpPr>
+        <p:spPr>
+          <a:xfrm>
+            <a:off x="2734088" y="3025224"/>
+            <a:ext cx="1412272" cy="18729"/>
+          </a:xfrm>
+          <a:prstGeom prst="straightConnector1">
+            <a:avLst/>
+          </a:prstGeom>
+          <a:ln>
+            <a:headEnd type="none"/>
+            <a:tailEnd type="triangle"/>
+          </a:ln>
+        </p:spPr>
+        <p:style>
+          <a:lnRef idx="1">
+            <a:schemeClr val="accent1"/>
+          </a:lnRef>
+          <a:fillRef idx="0">
+            <a:schemeClr val="accent1"/>
+          </a:fillRef>
+          <a:effectRef idx="0">
+            <a:schemeClr val="accent1"/>
+          </a:effectRef>
+          <a:fontRef idx="minor">
+            <a:schemeClr val="tx1"/>
+          </a:fontRef>
+        </p:style>
+      </p:cxnSp>
+      <p:sp>
+        <p:nvSpPr>
+          <p:cNvPr id="65" name="星形: 五角 64">
+            <a:extLst>
+              <a:ext uri="{FF2B5EF4-FFF2-40B4-BE49-F238E27FC236}">
+                <a16:creationId xmlns:a16="http://schemas.microsoft.com/office/drawing/2014/main" id="{8A67C090-6595-4D90-869F-8D325C57D7FE}"/>
+              </a:ext>
+            </a:extLst>
+          </p:cNvPr>
+          <p:cNvSpPr/>
+          <p:nvPr/>
+        </p:nvSpPr>
+        <p:spPr>
+          <a:xfrm>
+            <a:off x="8606541" y="2901245"/>
+            <a:ext cx="126991" cy="133343"/>
+          </a:xfrm>
+          <a:prstGeom prst="star5">
+            <a:avLst/>
+          </a:prstGeom>
+        </p:spPr>
+        <p:style>
+          <a:lnRef idx="2">
+            <a:schemeClr val="accent1">
+              <a:shade val="50000"/>
+            </a:schemeClr>
+          </a:lnRef>
+          <a:fillRef idx="1">
+            <a:schemeClr val="accent1"/>
+          </a:fillRef>
+          <a:effectRef idx="0">
+            <a:schemeClr val="accent1"/>
+          </a:effectRef>
+          <a:fontRef idx="minor">
+            <a:schemeClr val="lt1"/>
+          </a:fontRef>
+        </p:style>
+        <p:txBody>
+          <a:bodyPr rtlCol="0" anchor="ctr"/>
+          <a:lstStyle/>
+          <a:p>
+            <a:pPr algn="ctr"/>
+            <a:endParaRPr lang="zh-CN" altLang="en-US"/>
+          </a:p>
+        </p:txBody>
+      </p:sp>
+      <p:sp>
+        <p:nvSpPr>
+          <p:cNvPr id="66" name="星形: 五角 65">
+            <a:extLst>
+              <a:ext uri="{FF2B5EF4-FFF2-40B4-BE49-F238E27FC236}">
+                <a16:creationId xmlns:a16="http://schemas.microsoft.com/office/drawing/2014/main" id="{9FF7BD54-61FB-47C1-AAE9-E92E3E90C6A7}"/>
+              </a:ext>
+            </a:extLst>
+          </p:cNvPr>
+          <p:cNvSpPr/>
+          <p:nvPr/>
+        </p:nvSpPr>
+        <p:spPr>
+          <a:xfrm>
+            <a:off x="8443775" y="2552867"/>
+            <a:ext cx="126991" cy="133343"/>
+          </a:xfrm>
+          <a:prstGeom prst="star5">
+            <a:avLst/>
+          </a:prstGeom>
+        </p:spPr>
+        <p:style>
+          <a:lnRef idx="2">
+            <a:schemeClr val="accent1">
+              <a:shade val="50000"/>
+            </a:schemeClr>
+          </a:lnRef>
+          <a:fillRef idx="1">
+            <a:schemeClr val="accent1"/>
+          </a:fillRef>
+          <a:effectRef idx="0">
+            <a:schemeClr val="accent1"/>
+          </a:effectRef>
+          <a:fontRef idx="minor">
+            <a:schemeClr val="lt1"/>
+          </a:fontRef>
+        </p:style>
+        <p:txBody>
+          <a:bodyPr rtlCol="0" anchor="ctr"/>
+          <a:lstStyle/>
+          <a:p>
+            <a:pPr algn="ctr"/>
+            <a:endParaRPr lang="zh-CN" altLang="en-US"/>
+          </a:p>
+        </p:txBody>
+      </p:sp>
+      <p:sp>
+        <p:nvSpPr>
+          <p:cNvPr id="67" name="星形: 五角 66">
+            <a:extLst>
+              <a:ext uri="{FF2B5EF4-FFF2-40B4-BE49-F238E27FC236}">
+                <a16:creationId xmlns:a16="http://schemas.microsoft.com/office/drawing/2014/main" id="{AF75C024-7A4C-490F-83A7-E2A73677A162}"/>
+              </a:ext>
+            </a:extLst>
+          </p:cNvPr>
+          <p:cNvSpPr/>
+          <p:nvPr/>
+        </p:nvSpPr>
+        <p:spPr>
+          <a:xfrm>
+            <a:off x="7578174" y="2818282"/>
+            <a:ext cx="126991" cy="133343"/>
+          </a:xfrm>
+          <a:prstGeom prst="star5">
+            <a:avLst/>
+          </a:prstGeom>
+        </p:spPr>
+        <p:style>
+          <a:lnRef idx="2">
+            <a:schemeClr val="accent1">
+              <a:shade val="50000"/>
+            </a:schemeClr>
+          </a:lnRef>
+          <a:fillRef idx="1">
+            <a:schemeClr val="accent1"/>
+          </a:fillRef>
+          <a:effectRef idx="0">
+            <a:schemeClr val="accent1"/>
+          </a:effectRef>
+          <a:fontRef idx="minor">
+            <a:schemeClr val="lt1"/>
+          </a:fontRef>
+        </p:style>
+        <p:txBody>
+          <a:bodyPr rtlCol="0" anchor="ctr"/>
+          <a:lstStyle/>
+          <a:p>
+            <a:pPr algn="ctr"/>
+            <a:endParaRPr lang="zh-CN" altLang="en-US"/>
+          </a:p>
+        </p:txBody>
+      </p:sp>
+      <p:sp>
+        <p:nvSpPr>
+          <p:cNvPr id="68" name="星形: 五角 67">
+            <a:extLst>
+              <a:ext uri="{FF2B5EF4-FFF2-40B4-BE49-F238E27FC236}">
+                <a16:creationId xmlns:a16="http://schemas.microsoft.com/office/drawing/2014/main" id="{D7BFB892-12AC-4015-ABEC-84173A2B5282}"/>
+              </a:ext>
+            </a:extLst>
+          </p:cNvPr>
+          <p:cNvSpPr/>
+          <p:nvPr/>
+        </p:nvSpPr>
+        <p:spPr>
+          <a:xfrm>
+            <a:off x="7746845" y="3170346"/>
+            <a:ext cx="126991" cy="133343"/>
+          </a:xfrm>
+          <a:prstGeom prst="star5">
+            <a:avLst/>
+          </a:prstGeom>
+        </p:spPr>
+        <p:style>
+          <a:lnRef idx="2">
+            <a:schemeClr val="accent1">
+              <a:shade val="50000"/>
+            </a:schemeClr>
+          </a:lnRef>
+          <a:fillRef idx="1">
+            <a:schemeClr val="accent1"/>
+          </a:fillRef>
+          <a:effectRef idx="0">
+            <a:schemeClr val="accent1"/>
+          </a:effectRef>
+          <a:fontRef idx="minor">
+            <a:schemeClr val="lt1"/>
+          </a:fontRef>
+        </p:style>
+        <p:txBody>
+          <a:bodyPr rtlCol="0" anchor="ctr"/>
+          <a:lstStyle/>
+          <a:p>
+            <a:pPr algn="ctr"/>
+            <a:endParaRPr lang="zh-CN" altLang="en-US"/>
+          </a:p>
+        </p:txBody>
+      </p:sp>
+      <p:cxnSp>
+        <p:nvCxnSpPr>
+          <p:cNvPr id="42" name="直接箭头连接符 41">
+            <a:extLst>
+              <a:ext uri="{FF2B5EF4-FFF2-40B4-BE49-F238E27FC236}">
+                <a16:creationId xmlns:a16="http://schemas.microsoft.com/office/drawing/2014/main" id="{8E5B98CA-E259-4736-9ECC-FB2E8F0BCEF8}"/>
+              </a:ext>
+            </a:extLst>
+          </p:cNvPr>
+          <p:cNvCxnSpPr>
+            <a:cxnSpLocks/>
+            <a:stCxn id="40" idx="3"/>
+            <a:endCxn id="49" idx="2"/>
+          </p:cNvCxnSpPr>
+          <p:nvPr/>
+        </p:nvCxnSpPr>
+        <p:spPr>
+          <a:xfrm flipV="1">
+            <a:off x="3489394" y="3428673"/>
+            <a:ext cx="890363" cy="693366"/>
+          </a:xfrm>
+          <a:prstGeom prst="straightConnector1">
+            <a:avLst/>
+          </a:prstGeom>
+          <a:ln>
+            <a:solidFill>
+              <a:schemeClr val="accent6"/>
+            </a:solidFill>
+            <a:headEnd type="triangle"/>
+            <a:tailEnd type="triangle"/>
+          </a:ln>
+        </p:spPr>
+        <p:style>
+          <a:lnRef idx="1">
+            <a:schemeClr val="accent1"/>
+          </a:lnRef>
+          <a:fillRef idx="0">
+            <a:schemeClr val="accent1"/>
+          </a:fillRef>
+          <a:effectRef idx="0">
+            <a:schemeClr val="accent1"/>
+          </a:effectRef>
+          <a:fontRef idx="minor">
+            <a:schemeClr val="tx1"/>
+          </a:fontRef>
+        </p:style>
+      </p:cxnSp>
+      <p:cxnSp>
+        <p:nvCxnSpPr>
+          <p:cNvPr id="45" name="直接箭头连接符 44">
+            <a:extLst>
+              <a:ext uri="{FF2B5EF4-FFF2-40B4-BE49-F238E27FC236}">
+                <a16:creationId xmlns:a16="http://schemas.microsoft.com/office/drawing/2014/main" id="{6B59E987-ECBE-470F-88C9-33C046AECCFA}"/>
+              </a:ext>
+            </a:extLst>
+          </p:cNvPr>
+          <p:cNvCxnSpPr>
+            <a:cxnSpLocks/>
+          </p:cNvCxnSpPr>
+          <p:nvPr/>
+        </p:nvCxnSpPr>
+        <p:spPr>
+          <a:xfrm flipV="1">
+            <a:off x="2448596" y="2142826"/>
+            <a:ext cx="890363" cy="693366"/>
+          </a:xfrm>
+          <a:prstGeom prst="straightConnector1">
+            <a:avLst/>
+          </a:prstGeom>
+          <a:ln>
+            <a:solidFill>
+              <a:schemeClr val="accent6"/>
+            </a:solidFill>
+            <a:headEnd type="triangle"/>
+            <a:tailEnd type="triangle"/>
+          </a:ln>
+        </p:spPr>
+        <p:style>
+          <a:lnRef idx="1">
+            <a:schemeClr val="accent1"/>
+          </a:lnRef>
+          <a:fillRef idx="0">
+            <a:schemeClr val="accent1"/>
+          </a:fillRef>
+          <a:effectRef idx="0">
+            <a:schemeClr val="accent1"/>
+          </a:effectRef>
+          <a:fontRef idx="minor">
+            <a:schemeClr val="tx1"/>
+          </a:fontRef>
+        </p:style>
+      </p:cxnSp>
+      <p:cxnSp>
+        <p:nvCxnSpPr>
+          <p:cNvPr id="50" name="直接箭头连接符 49">
+            <a:extLst>
+              <a:ext uri="{FF2B5EF4-FFF2-40B4-BE49-F238E27FC236}">
+                <a16:creationId xmlns:a16="http://schemas.microsoft.com/office/drawing/2014/main" id="{E4AD0770-F6BA-464B-8233-0E76F0DFA2F8}"/>
+              </a:ext>
+            </a:extLst>
+          </p:cNvPr>
+          <p:cNvCxnSpPr>
+            <a:cxnSpLocks/>
+          </p:cNvCxnSpPr>
+          <p:nvPr/>
+        </p:nvCxnSpPr>
+        <p:spPr>
+          <a:xfrm flipV="1">
+            <a:off x="2043916" y="3253161"/>
+            <a:ext cx="393027" cy="717166"/>
+          </a:xfrm>
+          <a:prstGeom prst="straightConnector1">
+            <a:avLst/>
+          </a:prstGeom>
+          <a:ln>
+            <a:solidFill>
+              <a:schemeClr val="accent6"/>
+            </a:solidFill>
+            <a:headEnd type="triangle"/>
+            <a:tailEnd type="triangle"/>
+          </a:ln>
+        </p:spPr>
+        <p:style>
+          <a:lnRef idx="1">
+            <a:schemeClr val="accent1"/>
+          </a:lnRef>
+          <a:fillRef idx="0">
+            <a:schemeClr val="accent1"/>
+          </a:fillRef>
+          <a:effectRef idx="0">
+            <a:schemeClr val="accent1"/>
+          </a:effectRef>
+          <a:fontRef idx="minor">
+            <a:schemeClr val="tx1"/>
+          </a:fontRef>
+        </p:style>
+      </p:cxnSp>
+    </p:spTree>
+    <p:extLst>
+      <p:ext uri="{BB962C8B-B14F-4D97-AF65-F5344CB8AC3E}">
+        <p14:creationId xmlns:p14="http://schemas.microsoft.com/office/powerpoint/2010/main" val="433804072"/>
+      </p:ext>
+    </p:extLst>
+  </p:cSld>
+  <p:clrMapOvr>
+    <a:masterClrMapping/>
+  </p:clrMapOvr>
+</p:sld>
+</file>
+
+<file path=ppt/slides/slide4.xml><?xml version="1.0" encoding="utf-8"?>
+<p:sld xmlns:a="http://schemas.openxmlformats.org/drawingml/2006/main" xmlns:r="http://schemas.openxmlformats.org/officeDocument/2006/relationships" xmlns:p="http://schemas.openxmlformats.org/presentationml/2006/main">
+  <p:cSld>
+    <p:spTree>
+      <p:nvGrpSpPr>
+        <p:cNvPr id="1" name=""/>
+        <p:cNvGrpSpPr/>
+        <p:nvPr/>
+      </p:nvGrpSpPr>
+      <p:grpSpPr>
+        <a:xfrm>
+          <a:off x="0" y="0"/>
+          <a:ext cx="0" cy="0"/>
+          <a:chOff x="0" y="0"/>
+          <a:chExt cx="0" cy="0"/>
+        </a:xfrm>
+      </p:grpSpPr>
+      <p:sp>
+        <p:nvSpPr>
           <p:cNvPr id="2" name="标题 1">
             <a:extLst>
               <a:ext uri="{FF2B5EF4-FFF2-40B4-BE49-F238E27FC236}">

</xml_diff>